<commit_message>
Versión 2 de la primera presentación. Solo he cambiado una traspa y añadido la final.
</commit_message>
<xml_diff>
--- a/Documentos_generados/Integracion_Alcance/Entregable_1_Gestion.pptx
+++ b/Documentos_generados/Integracion_Alcance/Entregable_1_Gestion.pptx
@@ -5,7 +5,7 @@
     <p:sldMasterId id="2147483672" r:id="rId1"/>
   </p:sldMasterIdLst>
   <p:notesMasterIdLst>
-    <p:notesMasterId r:id="rId15"/>
+    <p:notesMasterId r:id="rId16"/>
   </p:notesMasterIdLst>
   <p:sldIdLst>
     <p:sldId id="256" r:id="rId2"/>
@@ -21,6 +21,7 @@
     <p:sldId id="267" r:id="rId12"/>
     <p:sldId id="268" r:id="rId13"/>
     <p:sldId id="271" r:id="rId14"/>
+    <p:sldId id="272" r:id="rId15"/>
   </p:sldIdLst>
   <p:sldSz cx="12192000" cy="6858000"/>
   <p:notesSz cx="6858000" cy="9144000"/>
@@ -10543,11 +10544,7 @@
           <a:p>
             <a:r>
               <a:rPr lang="es-ES_tradnl" dirty="0"/>
-              <a:t>Este proyecto surge de la necesidad de profundizar en la transformación digital de la sanidad. ya que en la Comunidad de Madrid existe una población </a:t>
-            </a:r>
-            <a:r>
-              <a:rPr lang="es-ES_tradnl" dirty="0" err="1"/>
-              <a:t>envejecid</a:t>
+              <a:t>Este proyecto surge de la necesidad de profundizar en la transformación digital de la sanidad. </a:t>
             </a:r>
             <a:endParaRPr lang="es-ES" dirty="0"/>
           </a:p>
@@ -15086,7 +15083,7 @@
               <a:rPr lang="es-ES" sz="1800" spc="-10" dirty="0">
                 <a:latin typeface="Helvetica Neue"/>
               </a:rPr>
-              <a:t>Definición detallada del alcance del proyecto y del  servicio.</a:t>
+              <a:t>Definición detallada del alcance del proyecto y del servicio.</a:t>
             </a:r>
           </a:p>
           <a:p>
@@ -15908,7 +15905,7 @@
                 <a:latin typeface="Helvetica Neue"/>
                 <a:cs typeface="Helvetica Neue"/>
               </a:rPr>
-              <a:t>Plan</a:t>
+              <a:t>Plan.</a:t>
             </a:r>
           </a:p>
           <a:p>
@@ -15951,10 +15948,13 @@
               </a:rPr>
               <a:t>Statement</a:t>
             </a:r>
-            <a:endParaRPr lang="es-ES" sz="3000" i="1" dirty="0">
-              <a:latin typeface="Helvetica Neue"/>
-              <a:cs typeface="Helvetica Neue"/>
-            </a:endParaRPr>
+            <a:r>
+              <a:rPr lang="es-ES" sz="3000" i="1" dirty="0">
+                <a:latin typeface="Helvetica Neue"/>
+                <a:cs typeface="Helvetica Neue"/>
+              </a:rPr>
+              <a:t>.</a:t>
+            </a:r>
           </a:p>
           <a:p>
             <a:endParaRPr lang="es-ES" dirty="0"/>
@@ -16630,6 +16630,154 @@
 </p:sld>
 </file>
 
+<file path=ppt/slides/slide14.xml><?xml version="1.0" encoding="utf-8"?>
+<p:sld xmlns:a="http://schemas.openxmlformats.org/drawingml/2006/main" xmlns:r="http://schemas.openxmlformats.org/officeDocument/2006/relationships" xmlns:p="http://schemas.openxmlformats.org/presentationml/2006/main">
+  <p:cSld>
+    <p:spTree>
+      <p:nvGrpSpPr>
+        <p:cNvPr id="1" name=""/>
+        <p:cNvGrpSpPr/>
+        <p:nvPr/>
+      </p:nvGrpSpPr>
+      <p:grpSpPr>
+        <a:xfrm>
+          <a:off x="0" y="0"/>
+          <a:ext cx="0" cy="0"/>
+          <a:chOff x="0" y="0"/>
+          <a:chExt cx="0" cy="0"/>
+        </a:xfrm>
+      </p:grpSpPr>
+      <p:sp>
+        <p:nvSpPr>
+          <p:cNvPr id="2" name="Título 1">
+            <a:extLst>
+              <a:ext uri="{FF2B5EF4-FFF2-40B4-BE49-F238E27FC236}">
+                <a16:creationId xmlns:a16="http://schemas.microsoft.com/office/drawing/2014/main" id="{D7E12B97-FFA3-480C-8FE2-C6F2D37E6505}"/>
+              </a:ext>
+            </a:extLst>
+          </p:cNvPr>
+          <p:cNvSpPr>
+            <a:spLocks noGrp="1"/>
+          </p:cNvSpPr>
+          <p:nvPr>
+            <p:ph type="title"/>
+          </p:nvPr>
+        </p:nvSpPr>
+        <p:spPr/>
+        <p:txBody>
+          <a:bodyPr/>
+          <a:lstStyle/>
+          <a:p>
+            <a:pPr algn="ctr"/>
+            <a:r>
+              <a:rPr lang="es-ES_tradnl" b="1" dirty="0"/>
+              <a:t>GRACIAS POR SU ATENCIÓN</a:t>
+            </a:r>
+          </a:p>
+        </p:txBody>
+      </p:sp>
+      <p:sp>
+        <p:nvSpPr>
+          <p:cNvPr id="4" name="Marcador de pie de página 3">
+            <a:extLst>
+              <a:ext uri="{FF2B5EF4-FFF2-40B4-BE49-F238E27FC236}">
+                <a16:creationId xmlns:a16="http://schemas.microsoft.com/office/drawing/2014/main" id="{0EF87148-254E-4BE8-8FD3-5660A18BDA56}"/>
+              </a:ext>
+            </a:extLst>
+          </p:cNvPr>
+          <p:cNvSpPr>
+            <a:spLocks noGrp="1"/>
+          </p:cNvSpPr>
+          <p:nvPr>
+            <p:ph type="ftr" sz="quarter" idx="11"/>
+          </p:nvPr>
+        </p:nvSpPr>
+        <p:spPr/>
+        <p:txBody>
+          <a:bodyPr/>
+          <a:lstStyle/>
+          <a:p>
+            <a:r>
+              <a:rPr lang="es-ES"/>
+              <a:t>SAMBA Solutions</a:t>
+            </a:r>
+          </a:p>
+        </p:txBody>
+      </p:sp>
+      <p:sp>
+        <p:nvSpPr>
+          <p:cNvPr id="5" name="Marcador de número de diapositiva 4">
+            <a:extLst>
+              <a:ext uri="{FF2B5EF4-FFF2-40B4-BE49-F238E27FC236}">
+                <a16:creationId xmlns:a16="http://schemas.microsoft.com/office/drawing/2014/main" id="{C417D985-1958-4F09-8EA1-4F816C8A5D40}"/>
+              </a:ext>
+            </a:extLst>
+          </p:cNvPr>
+          <p:cNvSpPr>
+            <a:spLocks noGrp="1"/>
+          </p:cNvSpPr>
+          <p:nvPr>
+            <p:ph type="sldNum" sz="quarter" idx="12"/>
+          </p:nvPr>
+        </p:nvSpPr>
+        <p:spPr/>
+        <p:txBody>
+          <a:bodyPr/>
+          <a:lstStyle/>
+          <a:p>
+            <a:fld id="{A889D4C9-2D47-4298-B3EC-5A220480347F}" type="slidenum">
+              <a:rPr lang="es-ES" smtClean="0"/>
+              <a:t>14</a:t>
+            </a:fld>
+            <a:endParaRPr lang="es-ES"/>
+          </a:p>
+        </p:txBody>
+      </p:sp>
+      <p:pic>
+        <p:nvPicPr>
+          <p:cNvPr id="6" name="Marcador de contenido 5">
+            <a:extLst>
+              <a:ext uri="{FF2B5EF4-FFF2-40B4-BE49-F238E27FC236}">
+                <a16:creationId xmlns:a16="http://schemas.microsoft.com/office/drawing/2014/main" id="{61BC6674-FE5C-421D-857E-4F598BE43189}"/>
+              </a:ext>
+            </a:extLst>
+          </p:cNvPr>
+          <p:cNvPicPr>
+            <a:picLocks noGrp="1" noChangeAspect="1"/>
+          </p:cNvPicPr>
+          <p:nvPr>
+            <p:ph idx="1"/>
+          </p:nvPr>
+        </p:nvPicPr>
+        <p:blipFill>
+          <a:blip r:embed="rId2"/>
+          <a:stretch>
+            <a:fillRect/>
+          </a:stretch>
+        </p:blipFill>
+        <p:spPr>
+          <a:xfrm>
+            <a:off x="4570072" y="3190711"/>
+            <a:ext cx="3112182" cy="1333828"/>
+          </a:xfrm>
+          <a:prstGeom prst="rect">
+            <a:avLst/>
+          </a:prstGeom>
+        </p:spPr>
+      </p:pic>
+    </p:spTree>
+    <p:extLst>
+      <p:ext uri="{BB962C8B-B14F-4D97-AF65-F5344CB8AC3E}">
+        <p14:creationId xmlns:p14="http://schemas.microsoft.com/office/powerpoint/2010/main" val="3937112569"/>
+      </p:ext>
+    </p:extLst>
+  </p:cSld>
+  <p:clrMapOvr>
+    <a:masterClrMapping/>
+  </p:clrMapOvr>
+</p:sld>
+</file>
+
 <file path=ppt/slides/slide2.xml><?xml version="1.0" encoding="utf-8"?>
 <p:sld xmlns:a="http://schemas.openxmlformats.org/drawingml/2006/main" xmlns:r="http://schemas.openxmlformats.org/officeDocument/2006/relationships" xmlns:p="http://schemas.openxmlformats.org/presentationml/2006/main">
   <p:cSld>
@@ -17014,6 +17162,27 @@
             </a:r>
           </a:p>
           <a:p>
+            <a:pPr lvl="1" algn="just"/>
+            <a:r>
+              <a:rPr lang="es-ES_tradnl" dirty="0">
+                <a:latin typeface="Helvetica Neue"/>
+              </a:rPr>
+              <a:t>Actualmente existen pocos servicios digitales (</a:t>
+            </a:r>
+            <a:r>
+              <a:rPr lang="es-ES_tradnl" dirty="0" err="1">
+                <a:latin typeface="Helvetica Neue"/>
+              </a:rPr>
+              <a:t>p.e</a:t>
+            </a:r>
+            <a:r>
+              <a:rPr lang="es-ES_tradnl" dirty="0">
+                <a:latin typeface="Helvetica Neue"/>
+              </a:rPr>
+              <a:t> cita previa on-line).</a:t>
+            </a:r>
+          </a:p>
+          <a:p>
             <a:endParaRPr lang="es-ES_tradnl" dirty="0"/>
           </a:p>
           <a:p>
@@ -19407,14 +19576,14 @@
               <a:buNone/>
             </a:pPr>
             <a:r>
-              <a:rPr lang="es-ES" sz="1600" b="1" i="1" dirty="0">
+              <a:rPr lang="es-ES" sz="1800" b="1" i="1" dirty="0">
                 <a:latin typeface="Helvetica Neue"/>
                 <a:cs typeface="Helvetica Neue"/>
               </a:rPr>
               <a:t>    Fase de FORMACIÓN</a:t>
             </a:r>
             <a:r>
-              <a:rPr lang="es-ES" sz="1600" b="1" dirty="0">
+              <a:rPr lang="es-ES" sz="1800" b="1" dirty="0">
                 <a:latin typeface="Helvetica Neue"/>
                 <a:cs typeface="Helvetica Neue"/>
               </a:rPr>
@@ -19433,7 +19602,7 @@
               <a:buChar char="ü"/>
             </a:pPr>
             <a:r>
-              <a:rPr lang="es-ES" dirty="0">
+              <a:rPr lang="es-ES" sz="1600" dirty="0">
                 <a:latin typeface="Helvetica Neue"/>
               </a:rPr>
               <a:t> Retrasos en la formación y mayor número de cursos de los estimados.</a:t>

</xml_diff>

<commit_message>
He modificado las de diapositivas delplan de gestión del alcance y la recopilación de requisitos
</commit_message>
<xml_diff>
--- a/Documentos_generados/Integracion_Alcance/Entregable_1_Gestion.pptx
+++ b/Documentos_generados/Integracion_Alcance/Entregable_1_Gestion.pptx
@@ -126,6 +126,88 @@
     </p:ext>
   </p:extLst>
 </p:presentation>
+</file>
+
+<file path=ppt/revisionInfo.xml><?xml version="1.0" encoding="utf-8"?>
+<p1510:revInfo xmlns:a="http://schemas.openxmlformats.org/drawingml/2006/main" xmlns:r="http://schemas.openxmlformats.org/officeDocument/2006/relationships" xmlns:p1510="http://schemas.microsoft.com/office/powerpoint/2015/10/main">
+  <p1510:revLst>
+    <p1510:client id="{04F5FD51-03D3-6545-B4A0-068FC3AB0E18}" v="4" dt="2018-10-31T11:55:35.068"/>
+  </p1510:revLst>
+</p1510:revInfo>
+</file>
+
+<file path=ppt/changesInfos/changesInfo1.xml><?xml version="1.0" encoding="utf-8"?>
+<pc:chgInfo xmlns:a="http://schemas.openxmlformats.org/drawingml/2006/main" xmlns:r="http://schemas.openxmlformats.org/officeDocument/2006/relationships" xmlns:ac="http://schemas.microsoft.com/office/drawing/2013/main/command" xmlns:pc="http://schemas.microsoft.com/office/powerpoint/2013/main/command">
+  <pc:docChgLst>
+    <pc:chgData name="Constantin Boby Nicusor" userId="74e69734-843f-45c4-ab97-5116eab44204" providerId="ADAL" clId="{04F5FD51-03D3-6545-B4A0-068FC3AB0E18}"/>
+    <pc:docChg chg="undo custSel modSld">
+      <pc:chgData name="Constantin Boby Nicusor" userId="74e69734-843f-45c4-ab97-5116eab44204" providerId="ADAL" clId="{04F5FD51-03D3-6545-B4A0-068FC3AB0E18}" dt="2018-10-31T12:27:51.686" v="25" actId="27636"/>
+      <pc:docMkLst>
+        <pc:docMk/>
+      </pc:docMkLst>
+      <pc:sldChg chg="modSp">
+        <pc:chgData name="Constantin Boby Nicusor" userId="74e69734-843f-45c4-ab97-5116eab44204" providerId="ADAL" clId="{04F5FD51-03D3-6545-B4A0-068FC3AB0E18}" dt="2018-10-31T11:38:47.511" v="11" actId="20577"/>
+        <pc:sldMkLst>
+          <pc:docMk/>
+          <pc:sldMk cId="2752738702" sldId="264"/>
+        </pc:sldMkLst>
+        <pc:spChg chg="mod">
+          <ac:chgData name="Constantin Boby Nicusor" userId="74e69734-843f-45c4-ab97-5116eab44204" providerId="ADAL" clId="{04F5FD51-03D3-6545-B4A0-068FC3AB0E18}" dt="2018-10-31T11:38:47.511" v="11" actId="20577"/>
+          <ac:spMkLst>
+            <pc:docMk/>
+            <pc:sldMk cId="2752738702" sldId="264"/>
+            <ac:spMk id="3" creationId="{8E2F8C38-A93E-40F1-9AD8-4654FBD921E3}"/>
+          </ac:spMkLst>
+        </pc:spChg>
+      </pc:sldChg>
+      <pc:sldChg chg="modSp">
+        <pc:chgData name="Constantin Boby Nicusor" userId="74e69734-843f-45c4-ab97-5116eab44204" providerId="ADAL" clId="{04F5FD51-03D3-6545-B4A0-068FC3AB0E18}" dt="2018-10-31T12:27:51.686" v="25" actId="27636"/>
+        <pc:sldMkLst>
+          <pc:docMk/>
+          <pc:sldMk cId="3207624635" sldId="267"/>
+        </pc:sldMkLst>
+        <pc:spChg chg="mod">
+          <ac:chgData name="Constantin Boby Nicusor" userId="74e69734-843f-45c4-ab97-5116eab44204" providerId="ADAL" clId="{04F5FD51-03D3-6545-B4A0-068FC3AB0E18}" dt="2018-10-31T12:27:51.686" v="25" actId="27636"/>
+          <ac:spMkLst>
+            <pc:docMk/>
+            <pc:sldMk cId="3207624635" sldId="267"/>
+            <ac:spMk id="3" creationId="{DAE256DD-A7FF-4370-8A22-565C731748EA}"/>
+          </ac:spMkLst>
+        </pc:spChg>
+      </pc:sldChg>
+      <pc:sldChg chg="modSp">
+        <pc:chgData name="Constantin Boby Nicusor" userId="74e69734-843f-45c4-ab97-5116eab44204" providerId="ADAL" clId="{04F5FD51-03D3-6545-B4A0-068FC3AB0E18}" dt="2018-10-31T12:23:58.815" v="23" actId="20577"/>
+        <pc:sldMkLst>
+          <pc:docMk/>
+          <pc:sldMk cId="2859499063" sldId="270"/>
+        </pc:sldMkLst>
+        <pc:spChg chg="mod">
+          <ac:chgData name="Constantin Boby Nicusor" userId="74e69734-843f-45c4-ab97-5116eab44204" providerId="ADAL" clId="{04F5FD51-03D3-6545-B4A0-068FC3AB0E18}" dt="2018-10-31T12:23:58.815" v="23" actId="20577"/>
+          <ac:spMkLst>
+            <pc:docMk/>
+            <pc:sldMk cId="2859499063" sldId="270"/>
+            <ac:spMk id="3" creationId="{83C22CD5-6E3A-4D35-92BD-9D6DF671050E}"/>
+          </ac:spMkLst>
+        </pc:spChg>
+      </pc:sldChg>
+      <pc:sldChg chg="modSp">
+        <pc:chgData name="Constantin Boby Nicusor" userId="74e69734-843f-45c4-ab97-5116eab44204" providerId="ADAL" clId="{04F5FD51-03D3-6545-B4A0-068FC3AB0E18}" dt="2018-10-31T11:55:35.068" v="22" actId="404"/>
+        <pc:sldMkLst>
+          <pc:docMk/>
+          <pc:sldMk cId="319056875" sldId="271"/>
+        </pc:sldMkLst>
+        <pc:graphicFrameChg chg="mod">
+          <ac:chgData name="Constantin Boby Nicusor" userId="74e69734-843f-45c4-ab97-5116eab44204" providerId="ADAL" clId="{04F5FD51-03D3-6545-B4A0-068FC3AB0E18}" dt="2018-10-31T11:55:35.068" v="22" actId="404"/>
+          <ac:graphicFrameMkLst>
+            <pc:docMk/>
+            <pc:sldMk cId="319056875" sldId="271"/>
+            <ac:graphicFrameMk id="5" creationId="{B1D4F5CB-A1C0-4C4F-8233-2C428D357479}"/>
+          </ac:graphicFrameMkLst>
+        </pc:graphicFrameChg>
+      </pc:sldChg>
+    </pc:docChg>
+  </pc:docChgLst>
+</pc:chgInfo>
 </file>
 
 <file path=ppt/diagrams/colors1.xml><?xml version="1.0" encoding="utf-8"?>
@@ -3032,23 +3114,23 @@
     <dgm:cxn modelId="{8AF7D83C-2A35-4B4E-9A89-87807C35D1FB}" srcId="{C6E69E37-3961-44EE-94E9-D23872BEE4C9}" destId="{DEA8DC5E-722E-4FFF-BA91-EA999F6AAE91}" srcOrd="0" destOrd="0" parTransId="{CA5091F9-074B-4255-B185-C09D0BE2BF7B}" sibTransId="{64D4773E-534A-4E7B-A0A1-8D87DE867EA7}"/>
     <dgm:cxn modelId="{F43A8E44-9B47-4D7E-8329-80EC5ABF9395}" type="presOf" srcId="{DEA8DC5E-722E-4FFF-BA91-EA999F6AAE91}" destId="{7BE221F1-D798-4C16-8799-B83E93823230}" srcOrd="1" destOrd="0" presId="urn:microsoft.com/office/officeart/2005/8/layout/orgChart1"/>
     <dgm:cxn modelId="{40DA5146-9F60-4701-8D82-136D8894E042}" type="presOf" srcId="{22D68CCB-4BEE-4732-BA18-145918E71689}" destId="{0FC927ED-857B-4313-A368-FA9A78CDCA53}" srcOrd="1" destOrd="0" presId="urn:microsoft.com/office/officeart/2005/8/layout/orgChart1"/>
-    <dgm:cxn modelId="{209B5E68-B4EB-4C22-A72F-79DEC2BC90AF}" type="presOf" srcId="{0B8E2C65-A4D7-4B41-A006-CAAA09EDACC5}" destId="{7C260BE5-DA50-4DC7-A354-7B16FCB704BB}" srcOrd="0" destOrd="0" presId="urn:microsoft.com/office/officeart/2005/8/layout/orgChart1"/>
     <dgm:cxn modelId="{708F0249-606D-44ED-AFD7-9BF8CB22D766}" type="presOf" srcId="{6169ABB3-9EA3-4A97-9BDB-7BF1A5E8319C}" destId="{05D049D6-AF6E-4C2B-8276-2B64317A47F8}" srcOrd="0" destOrd="0" presId="urn:microsoft.com/office/officeart/2005/8/layout/orgChart1"/>
     <dgm:cxn modelId="{8F9BFC49-62BA-4DBB-A4FA-FDF3587EA851}" srcId="{6169ABB3-9EA3-4A97-9BDB-7BF1A5E8319C}" destId="{64108CB1-DB75-4E6C-B114-0F078EBFAA65}" srcOrd="0" destOrd="0" parTransId="{4672E1E4-8BCB-4F8A-9715-DD03D099E9B8}" sibTransId="{926064D3-9C23-498F-82E9-95C446588308}"/>
-    <dgm:cxn modelId="{B13B706B-2F53-4C1C-91F4-8FE7FD71A8D6}" type="presOf" srcId="{910FF4E3-4B73-471E-A733-428EDE879319}" destId="{46F4FD74-704A-4016-8D98-7FB4F6EADBCC}" srcOrd="1" destOrd="0" presId="urn:microsoft.com/office/officeart/2005/8/layout/orgChart1"/>
     <dgm:cxn modelId="{F277454C-874E-4BA0-9E1C-F7AFFB70AB46}" type="presOf" srcId="{64108CB1-DB75-4E6C-B114-0F078EBFAA65}" destId="{5DF77C1A-A626-446D-ADBC-0383B75A543F}" srcOrd="0" destOrd="0" presId="urn:microsoft.com/office/officeart/2005/8/layout/orgChart1"/>
     <dgm:cxn modelId="{7C3DE64C-953A-4B36-89BF-C3A300F94624}" srcId="{984E7E1A-DD08-4E2E-A546-5DAB66C40362}" destId="{FB132DEB-3EBB-4B7B-9E10-1EA28E437B0C}" srcOrd="3" destOrd="0" parTransId="{84BE1630-6BEF-48BE-BEB4-441EA60AE7C5}" sibTransId="{3DA0803E-74EB-47A7-880B-91D87ACD481A}"/>
     <dgm:cxn modelId="{D656EB4C-F00D-40AF-B5F5-F0E5964EF461}" type="presOf" srcId="{8D053341-47DE-4A56-8DB5-F4344314674C}" destId="{2631D634-B2DC-4C40-900E-B3234D296D95}" srcOrd="0" destOrd="0" presId="urn:microsoft.com/office/officeart/2005/8/layout/orgChart1"/>
     <dgm:cxn modelId="{299A2E4E-1BFE-4BD3-B090-E8EAC9A082B4}" type="presOf" srcId="{818A50AE-2897-4A8A-A2D4-C798E3839759}" destId="{B6E5B741-A132-4E0A-AB92-D525551560A0}" srcOrd="0" destOrd="0" presId="urn:microsoft.com/office/officeart/2005/8/layout/orgChart1"/>
+    <dgm:cxn modelId="{6193E151-7B4B-421D-8E3E-D3E6FEF0B0BC}" srcId="{64108CB1-DB75-4E6C-B114-0F078EBFAA65}" destId="{210E38F1-6443-4897-BC67-3DC469B10B3A}" srcOrd="0" destOrd="0" parTransId="{658605B8-67B6-4965-9219-87AD07A2BD57}" sibTransId="{0132DBF9-A877-41CA-AAEC-9BACB1A6367E}"/>
+    <dgm:cxn modelId="{B520D657-89AC-4A83-88D6-D9C8745F32BA}" type="presOf" srcId="{7B8C88F9-23A6-428A-9D84-EE8685A0B867}" destId="{14600E90-D988-401A-ACF3-289743898FE2}" srcOrd="1" destOrd="0" presId="urn:microsoft.com/office/officeart/2005/8/layout/orgChart1"/>
+    <dgm:cxn modelId="{80196A59-75D4-44AE-819C-275AEF8FCCEB}" type="presOf" srcId="{2B9145D1-EB7E-4900-B323-62729B920F30}" destId="{D5E70C68-534D-4A37-84EE-5EB47A92FC53}" srcOrd="1" destOrd="0" presId="urn:microsoft.com/office/officeart/2005/8/layout/orgChart1"/>
+    <dgm:cxn modelId="{2C44BE5A-DA2F-40A9-A4D5-E1CC46BCA983}" type="presOf" srcId="{51635E7D-94AB-42DB-A23F-6B9E2711ADB8}" destId="{43C503B7-7F2C-4301-BAE0-F5A5EC7D89DC}" srcOrd="0" destOrd="0" presId="urn:microsoft.com/office/officeart/2005/8/layout/orgChart1"/>
+    <dgm:cxn modelId="{209B5E68-B4EB-4C22-A72F-79DEC2BC90AF}" type="presOf" srcId="{0B8E2C65-A4D7-4B41-A006-CAAA09EDACC5}" destId="{7C260BE5-DA50-4DC7-A354-7B16FCB704BB}" srcOrd="0" destOrd="0" presId="urn:microsoft.com/office/officeart/2005/8/layout/orgChart1"/>
+    <dgm:cxn modelId="{B13B706B-2F53-4C1C-91F4-8FE7FD71A8D6}" type="presOf" srcId="{910FF4E3-4B73-471E-A733-428EDE879319}" destId="{46F4FD74-704A-4016-8D98-7FB4F6EADBCC}" srcOrd="1" destOrd="0" presId="urn:microsoft.com/office/officeart/2005/8/layout/orgChart1"/>
     <dgm:cxn modelId="{2E011B6F-317D-4162-B804-71E713D0055F}" type="presOf" srcId="{4672E1E4-8BCB-4F8A-9715-DD03D099E9B8}" destId="{BBB97725-B25E-4355-8662-39B1CA6E3AF8}" srcOrd="0" destOrd="0" presId="urn:microsoft.com/office/officeart/2005/8/layout/orgChart1"/>
     <dgm:cxn modelId="{7A8A2F70-ECB1-4FF7-A971-E13A92932D1B}" type="presOf" srcId="{F27108DA-E888-48DE-8C97-7FDC95CC2EF6}" destId="{1B837E92-2B36-43A4-96EA-0C495772B0D6}" srcOrd="1" destOrd="0" presId="urn:microsoft.com/office/officeart/2005/8/layout/orgChart1"/>
-    <dgm:cxn modelId="{6193E151-7B4B-421D-8E3E-D3E6FEF0B0BC}" srcId="{64108CB1-DB75-4E6C-B114-0F078EBFAA65}" destId="{210E38F1-6443-4897-BC67-3DC469B10B3A}" srcOrd="0" destOrd="0" parTransId="{658605B8-67B6-4965-9219-87AD07A2BD57}" sibTransId="{0132DBF9-A877-41CA-AAEC-9BACB1A6367E}"/>
     <dgm:cxn modelId="{E9FD1272-E01D-4880-BFDE-9A1AAA5292D5}" srcId="{910FF4E3-4B73-471E-A733-428EDE879319}" destId="{2B9145D1-EB7E-4900-B323-62729B920F30}" srcOrd="0" destOrd="0" parTransId="{5A1392F2-9813-4C0C-9524-55F25A946D72}" sibTransId="{FE9D72FD-6015-4C6F-8761-506C30B7F8B6}"/>
     <dgm:cxn modelId="{A96CD672-826A-4972-9CF3-876722608BF8}" type="presOf" srcId="{95F92B39-5BD1-41DA-921B-40270E333897}" destId="{C185A8C1-627C-4588-9CA7-DED5893DDA60}" srcOrd="0" destOrd="0" presId="urn:microsoft.com/office/officeart/2005/8/layout/orgChart1"/>
     <dgm:cxn modelId="{7B338675-6A35-493F-9E24-159F48C3B4EA}" type="presOf" srcId="{DEA8DC5E-722E-4FFF-BA91-EA999F6AAE91}" destId="{12EA0026-7264-4099-8D42-2AB7A739F3DE}" srcOrd="0" destOrd="0" presId="urn:microsoft.com/office/officeart/2005/8/layout/orgChart1"/>
-    <dgm:cxn modelId="{B520D657-89AC-4A83-88D6-D9C8745F32BA}" type="presOf" srcId="{7B8C88F9-23A6-428A-9D84-EE8685A0B867}" destId="{14600E90-D988-401A-ACF3-289743898FE2}" srcOrd="1" destOrd="0" presId="urn:microsoft.com/office/officeart/2005/8/layout/orgChart1"/>
-    <dgm:cxn modelId="{80196A59-75D4-44AE-819C-275AEF8FCCEB}" type="presOf" srcId="{2B9145D1-EB7E-4900-B323-62729B920F30}" destId="{D5E70C68-534D-4A37-84EE-5EB47A92FC53}" srcOrd="1" destOrd="0" presId="urn:microsoft.com/office/officeart/2005/8/layout/orgChart1"/>
-    <dgm:cxn modelId="{2C44BE5A-DA2F-40A9-A4D5-E1CC46BCA983}" type="presOf" srcId="{51635E7D-94AB-42DB-A23F-6B9E2711ADB8}" destId="{43C503B7-7F2C-4301-BAE0-F5A5EC7D89DC}" srcOrd="0" destOrd="0" presId="urn:microsoft.com/office/officeart/2005/8/layout/orgChart1"/>
     <dgm:cxn modelId="{797D3C82-B6C9-4620-A5E0-6CCAD0C3EEAC}" type="presOf" srcId="{7B0BD396-2B46-40BD-AC76-2EF21EDDDC81}" destId="{3AA3C7FD-558D-4D06-9B04-B2049EF23E1C}" srcOrd="0" destOrd="0" presId="urn:microsoft.com/office/officeart/2005/8/layout/orgChart1"/>
     <dgm:cxn modelId="{06E58D82-E0E1-420D-B104-BA19D6A4BFBC}" type="presOf" srcId="{845F5D8C-040E-4743-ACA2-252EB4E11E64}" destId="{7E060085-DFB1-4A38-A3B5-C538C9CADD58}" srcOrd="0" destOrd="0" presId="urn:microsoft.com/office/officeart/2005/8/layout/orgChart1"/>
     <dgm:cxn modelId="{43631583-F60A-4551-A972-2B31597B688A}" type="presOf" srcId="{658605B8-67B6-4965-9219-87AD07A2BD57}" destId="{394B37E9-BF88-4D82-BFAC-BE919FCF7D54}" srcOrd="0" destOrd="0" presId="urn:microsoft.com/office/officeart/2005/8/layout/orgChart1"/>
@@ -10225,7 +10307,7 @@
           <a:p>
             <a:fld id="{BB6DB4A3-1760-4834-86D9-2D27EA48F734}" type="datetimeFigureOut">
               <a:rPr lang="es-ES" smtClean="0"/>
-              <a:t>30/10/2018</a:t>
+              <a:t>31/10/18</a:t>
             </a:fld>
             <a:endParaRPr lang="es-ES"/>
           </a:p>
@@ -10536,16 +10618,6 @@
           <a:bodyPr/>
           <a:lstStyle/>
           <a:p>
-            <a:r>
-              <a:rPr lang="es-ES_tradnl" dirty="0"/>
-              <a:t>Para ello ha decidido contratar los servicios de un integrador especializado que ejecute el proyecto.</a:t>
-            </a:r>
-          </a:p>
-          <a:p>
-            <a:r>
-              <a:rPr lang="es-ES_tradnl" dirty="0"/>
-              <a:t>Este proyecto surge de la necesidad de profundizar en la transformación digital de la sanidad. </a:t>
-            </a:r>
             <a:endParaRPr lang="es-ES" dirty="0"/>
           </a:p>
         </p:txBody>
@@ -10557,7 +10629,7 @@
             <a:spLocks noGrp="1"/>
           </p:cNvSpPr>
           <p:nvPr>
-            <p:ph type="sldNum" sz="quarter" idx="10"/>
+            <p:ph type="sldNum" sz="quarter" idx="5"/>
           </p:nvPr>
         </p:nvSpPr>
         <p:spPr/>
@@ -10567,7 +10639,7 @@
           <a:p>
             <a:fld id="{5EEDEC7E-09EC-4CD0-90BA-4324AC3F20A1}" type="slidenum">
               <a:rPr lang="es-ES" smtClean="0"/>
-              <a:t>3</a:t>
+              <a:t>1</a:t>
             </a:fld>
             <a:endParaRPr lang="es-ES"/>
           </a:p>
@@ -10576,7 +10648,7 @@
     </p:spTree>
     <p:extLst>
       <p:ext uri="{BB962C8B-B14F-4D97-AF65-F5344CB8AC3E}">
-        <p14:creationId xmlns:p14="http://schemas.microsoft.com/office/powerpoint/2010/main" val="1714762630"/>
+        <p14:creationId xmlns:p14="http://schemas.microsoft.com/office/powerpoint/2010/main" val="590751859"/>
       </p:ext>
     </p:extLst>
   </p:cSld>
@@ -10632,28 +10704,14 @@
           <a:p>
             <a:r>
               <a:rPr lang="es-ES_tradnl" dirty="0"/>
-              <a:t>Existe alta demanda de servicios sanitarios de atención primaria, </a:t>
+              <a:t>Para ello ha decidido contratar los servicios de un integrador especializado que ejecute el proyecto.</a:t>
             </a:r>
           </a:p>
           <a:p>
             <a:r>
               <a:rPr lang="es-ES_tradnl" dirty="0"/>
-              <a:t>Por lo tanto ante tal demanda, con este sistema se pretende realizar una mejora en la eficiencia del sistema, reduciendo la necesidad de visitas presenciales y de evitar falsas alarmas en las urgencias.</a:t>
-            </a:r>
-          </a:p>
-          <a:p>
-            <a:r>
-              <a:rPr lang="es-ES_tradnl" dirty="0"/>
-              <a:t>Además, se mejorará la salud de los pacientes, puesto que se brindará un mayor control sanitario y esto permitirá a los médicos ofrecer un mejor tratamiento.</a:t>
-            </a:r>
-          </a:p>
-          <a:p>
-            <a:r>
-              <a:rPr lang="es-ES_tradnl" dirty="0"/>
-              <a:t>También con ello, se mejorará la experiencia de usuario ya que se realizará un sistema sanitario mas cercano y humano. </a:t>
-            </a:r>
-          </a:p>
-          <a:p>
+              <a:t>Este proyecto surge de la necesidad de profundizar en la transformación digital de la sanidad. </a:t>
+            </a:r>
             <a:endParaRPr lang="es-ES" dirty="0"/>
           </a:p>
         </p:txBody>
@@ -10675,7 +10733,7 @@
           <a:p>
             <a:fld id="{5EEDEC7E-09EC-4CD0-90BA-4324AC3F20A1}" type="slidenum">
               <a:rPr lang="es-ES" smtClean="0"/>
-              <a:t>4</a:t>
+              <a:t>3</a:t>
             </a:fld>
             <a:endParaRPr lang="es-ES"/>
           </a:p>
@@ -10684,7 +10742,7 @@
     </p:spTree>
     <p:extLst>
       <p:ext uri="{BB962C8B-B14F-4D97-AF65-F5344CB8AC3E}">
-        <p14:creationId xmlns:p14="http://schemas.microsoft.com/office/powerpoint/2010/main" val="4291343566"/>
+        <p14:creationId xmlns:p14="http://schemas.microsoft.com/office/powerpoint/2010/main" val="1714762630"/>
       </p:ext>
     </p:extLst>
   </p:cSld>
@@ -10740,8 +10798,28 @@
           <a:p>
             <a:r>
               <a:rPr lang="es-ES_tradnl" dirty="0"/>
-              <a:t>Para llevar a cabo este proyecto, se nos plantean los siguientes requisitos:</a:t>
-            </a:r>
+              <a:t>Existe alta demanda de servicios sanitarios de atención primaria, </a:t>
+            </a:r>
+          </a:p>
+          <a:p>
+            <a:r>
+              <a:rPr lang="es-ES_tradnl" dirty="0"/>
+              <a:t>Por lo tanto ante tal demanda, con este sistema se pretende realizar una mejora en la eficiencia del sistema, reduciendo la necesidad de visitas presenciales y de evitar falsas alarmas en las urgencias.</a:t>
+            </a:r>
+          </a:p>
+          <a:p>
+            <a:r>
+              <a:rPr lang="es-ES_tradnl" dirty="0"/>
+              <a:t>Además, se mejorará la salud de los pacientes, puesto que se brindará un mayor control sanitario y esto permitirá a los médicos ofrecer un mejor tratamiento.</a:t>
+            </a:r>
+          </a:p>
+          <a:p>
+            <a:r>
+              <a:rPr lang="es-ES_tradnl" dirty="0"/>
+              <a:t>También con ello, se mejorará la experiencia de usuario ya que se realizará un sistema sanitario mas cercano y humano. </a:t>
+            </a:r>
+          </a:p>
+          <a:p>
             <a:endParaRPr lang="es-ES" dirty="0"/>
           </a:p>
         </p:txBody>
@@ -10763,7 +10841,7 @@
           <a:p>
             <a:fld id="{5EEDEC7E-09EC-4CD0-90BA-4324AC3F20A1}" type="slidenum">
               <a:rPr lang="es-ES" smtClean="0"/>
-              <a:t>5</a:t>
+              <a:t>4</a:t>
             </a:fld>
             <a:endParaRPr lang="es-ES"/>
           </a:p>
@@ -10772,7 +10850,7 @@
     </p:spTree>
     <p:extLst>
       <p:ext uri="{BB962C8B-B14F-4D97-AF65-F5344CB8AC3E}">
-        <p14:creationId xmlns:p14="http://schemas.microsoft.com/office/powerpoint/2010/main" val="4160281657"/>
+        <p14:creationId xmlns:p14="http://schemas.microsoft.com/office/powerpoint/2010/main" val="4291343566"/>
       </p:ext>
     </p:extLst>
   </p:cSld>
@@ -10828,7 +10906,7 @@
           <a:p>
             <a:r>
               <a:rPr lang="es-ES_tradnl" dirty="0"/>
-              <a:t>En cuanto a la gestión de nuestros procesos que componen nuestra WBS, (la cuál veremos más adelante), tenemos los siguientes activos: </a:t>
+              <a:t>Para llevar a cabo este proyecto, se nos plantean los siguientes requisitos:</a:t>
             </a:r>
             <a:endParaRPr lang="es-ES" dirty="0"/>
           </a:p>
@@ -10851,6 +10929,94 @@
           <a:p>
             <a:fld id="{5EEDEC7E-09EC-4CD0-90BA-4324AC3F20A1}" type="slidenum">
               <a:rPr lang="es-ES" smtClean="0"/>
+              <a:t>5</a:t>
+            </a:fld>
+            <a:endParaRPr lang="es-ES"/>
+          </a:p>
+        </p:txBody>
+      </p:sp>
+    </p:spTree>
+    <p:extLst>
+      <p:ext uri="{BB962C8B-B14F-4D97-AF65-F5344CB8AC3E}">
+        <p14:creationId xmlns:p14="http://schemas.microsoft.com/office/powerpoint/2010/main" val="4160281657"/>
+      </p:ext>
+    </p:extLst>
+  </p:cSld>
+  <p:clrMapOvr>
+    <a:masterClrMapping/>
+  </p:clrMapOvr>
+</p:notes>
+</file>
+
+<file path=ppt/notesSlides/notesSlide5.xml><?xml version="1.0" encoding="utf-8"?>
+<p:notes xmlns:a="http://schemas.openxmlformats.org/drawingml/2006/main" xmlns:r="http://schemas.openxmlformats.org/officeDocument/2006/relationships" xmlns:p="http://schemas.openxmlformats.org/presentationml/2006/main">
+  <p:cSld>
+    <p:spTree>
+      <p:nvGrpSpPr>
+        <p:cNvPr id="1" name=""/>
+        <p:cNvGrpSpPr/>
+        <p:nvPr/>
+      </p:nvGrpSpPr>
+      <p:grpSpPr>
+        <a:xfrm>
+          <a:off x="0" y="0"/>
+          <a:ext cx="0" cy="0"/>
+          <a:chOff x="0" y="0"/>
+          <a:chExt cx="0" cy="0"/>
+        </a:xfrm>
+      </p:grpSpPr>
+      <p:sp>
+        <p:nvSpPr>
+          <p:cNvPr id="2" name="Marcador de imagen de diapositiva 1"/>
+          <p:cNvSpPr>
+            <a:spLocks noGrp="1" noRot="1" noChangeAspect="1"/>
+          </p:cNvSpPr>
+          <p:nvPr>
+            <p:ph type="sldImg"/>
+          </p:nvPr>
+        </p:nvSpPr>
+        <p:spPr/>
+      </p:sp>
+      <p:sp>
+        <p:nvSpPr>
+          <p:cNvPr id="3" name="Marcador de notas 2"/>
+          <p:cNvSpPr>
+            <a:spLocks noGrp="1"/>
+          </p:cNvSpPr>
+          <p:nvPr>
+            <p:ph type="body" idx="1"/>
+          </p:nvPr>
+        </p:nvSpPr>
+        <p:spPr/>
+        <p:txBody>
+          <a:bodyPr/>
+          <a:lstStyle/>
+          <a:p>
+            <a:r>
+              <a:rPr lang="es-ES_tradnl" dirty="0"/>
+              <a:t>En cuanto a la gestión de nuestros procesos que componen nuestra WBS, (la cuál veremos más adelante), tenemos los siguientes activos: </a:t>
+            </a:r>
+            <a:endParaRPr lang="es-ES" dirty="0"/>
+          </a:p>
+        </p:txBody>
+      </p:sp>
+      <p:sp>
+        <p:nvSpPr>
+          <p:cNvPr id="4" name="Marcador de número de diapositiva 3"/>
+          <p:cNvSpPr>
+            <a:spLocks noGrp="1"/>
+          </p:cNvSpPr>
+          <p:nvPr>
+            <p:ph type="sldNum" sz="quarter" idx="10"/>
+          </p:nvPr>
+        </p:nvSpPr>
+        <p:spPr/>
+        <p:txBody>
+          <a:bodyPr/>
+          <a:lstStyle/>
+          <a:p>
+            <a:fld id="{5EEDEC7E-09EC-4CD0-90BA-4324AC3F20A1}" type="slidenum">
+              <a:rPr lang="es-ES" smtClean="0"/>
               <a:t>7</a:t>
             </a:fld>
             <a:endParaRPr lang="es-ES"/>
@@ -10870,7 +11036,91 @@
 </p:notes>
 </file>
 
-<file path=ppt/notesSlides/notesSlide5.xml><?xml version="1.0" encoding="utf-8"?>
+<file path=ppt/notesSlides/notesSlide6.xml><?xml version="1.0" encoding="utf-8"?>
+<p:notes xmlns:a="http://schemas.openxmlformats.org/drawingml/2006/main" xmlns:r="http://schemas.openxmlformats.org/officeDocument/2006/relationships" xmlns:p="http://schemas.openxmlformats.org/presentationml/2006/main">
+  <p:cSld>
+    <p:spTree>
+      <p:nvGrpSpPr>
+        <p:cNvPr id="1" name=""/>
+        <p:cNvGrpSpPr/>
+        <p:nvPr/>
+      </p:nvGrpSpPr>
+      <p:grpSpPr>
+        <a:xfrm>
+          <a:off x="0" y="0"/>
+          <a:ext cx="0" cy="0"/>
+          <a:chOff x="0" y="0"/>
+          <a:chExt cx="0" cy="0"/>
+        </a:xfrm>
+      </p:grpSpPr>
+      <p:sp>
+        <p:nvSpPr>
+          <p:cNvPr id="2" name="Marcador de imagen de diapositiva 1"/>
+          <p:cNvSpPr>
+            <a:spLocks noGrp="1" noRot="1" noChangeAspect="1"/>
+          </p:cNvSpPr>
+          <p:nvPr>
+            <p:ph type="sldImg"/>
+          </p:nvPr>
+        </p:nvSpPr>
+        <p:spPr/>
+      </p:sp>
+      <p:sp>
+        <p:nvSpPr>
+          <p:cNvPr id="3" name="Marcador de notas 2"/>
+          <p:cNvSpPr>
+            <a:spLocks noGrp="1"/>
+          </p:cNvSpPr>
+          <p:nvPr>
+            <p:ph type="body" idx="1"/>
+          </p:nvPr>
+        </p:nvSpPr>
+        <p:spPr/>
+        <p:txBody>
+          <a:bodyPr/>
+          <a:lstStyle/>
+          <a:p>
+            <a:endParaRPr lang="es-ES" dirty="0"/>
+          </a:p>
+        </p:txBody>
+      </p:sp>
+      <p:sp>
+        <p:nvSpPr>
+          <p:cNvPr id="4" name="Marcador de número de diapositiva 3"/>
+          <p:cNvSpPr>
+            <a:spLocks noGrp="1"/>
+          </p:cNvSpPr>
+          <p:nvPr>
+            <p:ph type="sldNum" sz="quarter" idx="5"/>
+          </p:nvPr>
+        </p:nvSpPr>
+        <p:spPr/>
+        <p:txBody>
+          <a:bodyPr/>
+          <a:lstStyle/>
+          <a:p>
+            <a:fld id="{5EEDEC7E-09EC-4CD0-90BA-4324AC3F20A1}" type="slidenum">
+              <a:rPr lang="es-ES" smtClean="0"/>
+              <a:t>10</a:t>
+            </a:fld>
+            <a:endParaRPr lang="es-ES"/>
+          </a:p>
+        </p:txBody>
+      </p:sp>
+    </p:spTree>
+    <p:extLst>
+      <p:ext uri="{BB962C8B-B14F-4D97-AF65-F5344CB8AC3E}">
+        <p14:creationId xmlns:p14="http://schemas.microsoft.com/office/powerpoint/2010/main" val="1360125520"/>
+      </p:ext>
+    </p:extLst>
+  </p:cSld>
+  <p:clrMapOvr>
+    <a:masterClrMapping/>
+  </p:clrMapOvr>
+</p:notes>
+</file>
+
+<file path=ppt/notesSlides/notesSlide7.xml><?xml version="1.0" encoding="utf-8"?>
 <p:notes xmlns:a="http://schemas.openxmlformats.org/drawingml/2006/main" xmlns:r="http://schemas.openxmlformats.org/officeDocument/2006/relationships" xmlns:p="http://schemas.openxmlformats.org/presentationml/2006/main">
   <p:cSld>
     <p:spTree>
@@ -11183,7 +11433,7 @@
           <a:p>
             <a:fld id="{FF8F9C15-9B70-4CA9-BAAB-42894FA5E652}" type="datetime1">
               <a:rPr lang="es-ES" smtClean="0"/>
-              <a:t>30/10/2018</a:t>
+              <a:t>31/10/18</a:t>
             </a:fld>
             <a:endParaRPr lang="es-ES"/>
           </a:p>
@@ -11394,7 +11644,7 @@
           <a:p>
             <a:fld id="{85D9AF09-5586-4138-92EA-9EF4143C36B7}" type="datetime1">
               <a:rPr lang="es-ES" smtClean="0"/>
-              <a:t>30/10/2018</a:t>
+              <a:t>31/10/18</a:t>
             </a:fld>
             <a:endParaRPr lang="es-ES"/>
           </a:p>
@@ -11653,7 +11903,7 @@
           <a:p>
             <a:fld id="{74A81CB4-9AA6-49A3-8B8A-948D520F051B}" type="datetime1">
               <a:rPr lang="es-ES" smtClean="0"/>
-              <a:t>30/10/2018</a:t>
+              <a:t>31/10/18</a:t>
             </a:fld>
             <a:endParaRPr lang="es-ES"/>
           </a:p>
@@ -11826,7 +12076,7 @@
           <a:p>
             <a:fld id="{FCADA231-2EEE-49C3-9A76-F08024F4CB0C}" type="datetime1">
               <a:rPr lang="es-ES" smtClean="0"/>
-              <a:t>30/10/2018</a:t>
+              <a:t>31/10/18</a:t>
             </a:fld>
             <a:endParaRPr lang="es-ES"/>
           </a:p>
@@ -12172,7 +12422,7 @@
           <a:p>
             <a:fld id="{B097E9D6-1C6E-4AC9-8D68-56606CF0BDBC}" type="datetime1">
               <a:rPr lang="es-ES" smtClean="0"/>
-              <a:t>30/10/2018</a:t>
+              <a:t>31/10/18</a:t>
             </a:fld>
             <a:endParaRPr lang="es-ES"/>
           </a:p>
@@ -12450,7 +12700,7 @@
           <a:p>
             <a:fld id="{1C123174-D812-484D-81B2-308223A7FCD8}" type="datetime1">
               <a:rPr lang="es-ES" smtClean="0"/>
-              <a:t>30/10/2018</a:t>
+              <a:t>31/10/18</a:t>
             </a:fld>
             <a:endParaRPr lang="es-ES"/>
           </a:p>
@@ -12832,7 +13082,7 @@
           <a:p>
             <a:fld id="{EB34A60C-E688-482B-9CE0-0E6CF9AED751}" type="datetime1">
               <a:rPr lang="es-ES" smtClean="0"/>
-              <a:t>30/10/2018</a:t>
+              <a:t>31/10/18</a:t>
             </a:fld>
             <a:endParaRPr lang="es-ES"/>
           </a:p>
@@ -12953,7 +13203,7 @@
           <a:p>
             <a:fld id="{B68F0DBC-57A1-4E1A-A5EA-BCE564710AA8}" type="datetime1">
               <a:rPr lang="es-ES" smtClean="0"/>
-              <a:t>30/10/2018</a:t>
+              <a:t>31/10/18</a:t>
             </a:fld>
             <a:endParaRPr lang="es-ES"/>
           </a:p>
@@ -13127,7 +13377,7 @@
           <a:p>
             <a:fld id="{24C80875-414B-4474-9A58-D03825F28680}" type="datetime1">
               <a:rPr lang="es-ES" smtClean="0"/>
-              <a:t>30/10/2018</a:t>
+              <a:t>31/10/18</a:t>
             </a:fld>
             <a:endParaRPr lang="es-ES"/>
           </a:p>
@@ -13484,7 +13734,7 @@
           <a:p>
             <a:fld id="{B6F310FC-B9B0-45A2-86D5-A96A920F28C4}" type="datetime1">
               <a:rPr lang="es-ES" smtClean="0"/>
-              <a:t>30/10/2018</a:t>
+              <a:t>31/10/18</a:t>
             </a:fld>
             <a:endParaRPr lang="es-ES"/>
           </a:p>
@@ -13864,7 +14114,7 @@
           <a:p>
             <a:fld id="{24F22986-0094-4511-80EE-0754AA3F7407}" type="datetime1">
               <a:rPr lang="es-ES" smtClean="0"/>
-              <a:t>30/10/2018</a:t>
+              <a:t>31/10/18</a:t>
             </a:fld>
             <a:endParaRPr lang="es-ES"/>
           </a:p>
@@ -14154,7 +14404,7 @@
           <a:p>
             <a:fld id="{BB218966-D51D-4410-BB2A-F90FB18E3632}" type="datetime1">
               <a:rPr lang="es-ES" smtClean="0"/>
-              <a:t>30/10/2018</a:t>
+              <a:t>31/10/18</a:t>
             </a:fld>
             <a:endParaRPr lang="es-ES"/>
           </a:p>
@@ -14896,7 +15146,7 @@
           <p:nvPr/>
         </p:nvPicPr>
         <p:blipFill>
-          <a:blip r:embed="rId2"/>
+          <a:blip r:embed="rId3"/>
           <a:stretch>
             <a:fillRect/>
           </a:stretch>
@@ -14994,7 +15244,7 @@
         </p:spPr>
         <p:txBody>
           <a:bodyPr>
-            <a:normAutofit fontScale="92500" lnSpcReduction="20000"/>
+            <a:normAutofit/>
           </a:bodyPr>
           <a:lstStyle/>
           <a:p>
@@ -15113,159 +15363,14 @@
                 <a:latin typeface="Helvetica Neue"/>
                 <a:cs typeface="Helvetica Neue"/>
               </a:rPr>
-              <a:t>del </a:t>
-            </a:r>
-            <a:r>
-              <a:rPr lang="es-ES" sz="1800" i="1" spc="-10" dirty="0" err="1">
-                <a:latin typeface="Helvetica Neue"/>
-                <a:cs typeface="Helvetica Neue"/>
-              </a:rPr>
-              <a:t>Requirement</a:t>
-            </a:r>
-            <a:r>
-              <a:rPr lang="es-ES" sz="1800" i="1" spc="-10" dirty="0">
-                <a:latin typeface="Helvetica Neue"/>
-                <a:cs typeface="Helvetica Neue"/>
-              </a:rPr>
-              <a:t> </a:t>
-            </a:r>
-            <a:r>
-              <a:rPr lang="es-ES" sz="1800" i="1" spc="-5" dirty="0">
-                <a:latin typeface="Helvetica Neue"/>
-                <a:cs typeface="Helvetica Neue"/>
-              </a:rPr>
-              <a:t>Management</a:t>
-            </a:r>
-            <a:r>
-              <a:rPr lang="es-ES" sz="1800" i="1" spc="5" dirty="0">
-                <a:latin typeface="Helvetica Neue"/>
-                <a:cs typeface="Helvetica Neue"/>
-              </a:rPr>
-              <a:t> </a:t>
-            </a:r>
-            <a:r>
-              <a:rPr lang="es-ES" sz="1800" i="1" spc="-5" dirty="0">
-                <a:latin typeface="Helvetica Neue"/>
-                <a:cs typeface="Helvetica Neue"/>
-              </a:rPr>
-              <a:t>Plan</a:t>
-            </a:r>
-            <a:r>
-              <a:rPr lang="es-ES" sz="1800" spc="-5" dirty="0">
+              <a:t>del EDT/WBS</a:t>
+            </a:r>
+            <a:r>
+              <a:rPr lang="es-ES" sz="1800" spc="-10" dirty="0">
                 <a:latin typeface="Helvetica Neue"/>
                 <a:cs typeface="Helvetica Neue"/>
               </a:rPr>
               <a:t>.</a:t>
-            </a:r>
-            <a:endParaRPr lang="es-ES" dirty="0">
-              <a:latin typeface="Helvetica Neue"/>
-              <a:cs typeface="Helvetica Neue"/>
-            </a:endParaRPr>
-          </a:p>
-          <a:p>
-            <a:pPr marL="572770" marR="5080" lvl="1" indent="-285750">
-              <a:lnSpc>
-                <a:spcPct val="120000"/>
-              </a:lnSpc>
-              <a:spcBef>
-                <a:spcPts val="275"/>
-              </a:spcBef>
-              <a:buSzPct val="143939"/>
-              <a:buFont typeface="Wingdings" panose="05000000000000000000" pitchFamily="2" charset="2"/>
-              <a:buChar char="ü"/>
-              <a:tabLst>
-                <a:tab pos="444500" algn="l"/>
-              </a:tabLst>
-            </a:pPr>
-            <a:r>
-              <a:rPr lang="es-ES" sz="1800" spc="-5" dirty="0">
-                <a:latin typeface="Helvetica Neue"/>
-                <a:cs typeface="Helvetica Neue"/>
-              </a:rPr>
-              <a:t>Generación del </a:t>
-            </a:r>
-            <a:r>
-              <a:rPr lang="es-ES" sz="1800" i="1" spc="-10" dirty="0">
-                <a:latin typeface="Helvetica Neue"/>
-                <a:cs typeface="Helvetica Neue"/>
-              </a:rPr>
-              <a:t>Project </a:t>
-            </a:r>
-            <a:r>
-              <a:rPr lang="es-ES" sz="1800" i="1" spc="-5" dirty="0" err="1">
-                <a:latin typeface="Helvetica Neue"/>
-                <a:cs typeface="Helvetica Neue"/>
-              </a:rPr>
-              <a:t>Scope</a:t>
-            </a:r>
-            <a:r>
-              <a:rPr lang="es-ES" sz="1800" i="1" dirty="0">
-                <a:latin typeface="Helvetica Neue"/>
-                <a:cs typeface="Helvetica Neue"/>
-              </a:rPr>
-              <a:t> </a:t>
-            </a:r>
-            <a:r>
-              <a:rPr lang="es-ES" sz="1800" i="1" spc="-5" dirty="0" err="1">
-                <a:latin typeface="Helvetica Neue"/>
-                <a:cs typeface="Helvetica Neue"/>
-              </a:rPr>
-              <a:t>Statement</a:t>
-            </a:r>
-            <a:r>
-              <a:rPr lang="es-ES" sz="1800" i="1" spc="-5" dirty="0">
-                <a:latin typeface="Helvetica Neue"/>
-                <a:cs typeface="Helvetica Neue"/>
-              </a:rPr>
-              <a:t>.</a:t>
-            </a:r>
-            <a:endParaRPr lang="es-ES" i="1" dirty="0">
-              <a:latin typeface="Helvetica Neue"/>
-              <a:cs typeface="Helvetica Neue"/>
-            </a:endParaRPr>
-          </a:p>
-          <a:p>
-            <a:pPr marL="572770" marR="5080" lvl="1" indent="-285750">
-              <a:lnSpc>
-                <a:spcPct val="120000"/>
-              </a:lnSpc>
-              <a:spcBef>
-                <a:spcPts val="275"/>
-              </a:spcBef>
-              <a:buSzPct val="143939"/>
-              <a:buFont typeface="Wingdings" panose="05000000000000000000" pitchFamily="2" charset="2"/>
-              <a:buChar char="ü"/>
-              <a:tabLst>
-                <a:tab pos="444500" algn="l"/>
-              </a:tabLst>
-            </a:pPr>
-            <a:r>
-              <a:rPr lang="es-ES" sz="1800" spc="-10" dirty="0">
-                <a:latin typeface="Helvetica Neue"/>
-                <a:cs typeface="Helvetica Neue"/>
-              </a:rPr>
-              <a:t>Creación </a:t>
-            </a:r>
-            <a:r>
-              <a:rPr lang="es-ES" sz="1800" spc="-5" dirty="0">
-                <a:latin typeface="Helvetica Neue"/>
-                <a:cs typeface="Helvetica Neue"/>
-              </a:rPr>
-              <a:t>del EDT/WBS a partir de los dos</a:t>
-            </a:r>
-            <a:r>
-              <a:rPr lang="es-ES" sz="1800" spc="25" dirty="0">
-                <a:latin typeface="Helvetica Neue"/>
-                <a:cs typeface="Helvetica Neue"/>
-              </a:rPr>
-              <a:t> </a:t>
-            </a:r>
-            <a:r>
-              <a:rPr lang="es-ES" sz="1800" spc="-10" dirty="0">
-                <a:latin typeface="Helvetica Neue"/>
-                <a:cs typeface="Helvetica Neue"/>
-              </a:rPr>
-              <a:t>anteriores.</a:t>
             </a:r>
             <a:endParaRPr lang="es-ES" dirty="0">
               <a:latin typeface="Helvetica Neue"/>
@@ -15511,7 +15616,7 @@
           <p:nvPr/>
         </p:nvPicPr>
         <p:blipFill>
-          <a:blip r:embed="rId2"/>
+          <a:blip r:embed="rId3"/>
           <a:stretch>
             <a:fillRect/>
           </a:stretch>
@@ -15665,7 +15770,7 @@
         </p:spPr>
         <p:txBody>
           <a:bodyPr>
-            <a:normAutofit fontScale="70000" lnSpcReduction="20000"/>
+            <a:normAutofit/>
           </a:bodyPr>
           <a:lstStyle/>
           <a:p>
@@ -15825,136 +15930,6 @@
               <a:latin typeface="Helvetica Neue"/>
               <a:cs typeface="Times New Roman"/>
             </a:endParaRPr>
-          </a:p>
-          <a:p>
-            <a:pPr marL="469900" indent="-457200">
-              <a:lnSpc>
-                <a:spcPct val="120000"/>
-              </a:lnSpc>
-              <a:buSzPct val="144117"/>
-              <a:buFont typeface="Wingdings" panose="05000000000000000000" pitchFamily="2" charset="2"/>
-              <a:buChar char="v"/>
-              <a:tabLst>
-                <a:tab pos="431800" algn="l"/>
-              </a:tabLst>
-            </a:pPr>
-            <a:r>
-              <a:rPr lang="es-ES" sz="3400" dirty="0">
-                <a:latin typeface="Helvetica Neue"/>
-                <a:cs typeface="Helvetica Neue"/>
-              </a:rPr>
-              <a:t> Análisis de </a:t>
-            </a:r>
-            <a:r>
-              <a:rPr lang="es-ES" sz="3400" spc="-10" dirty="0">
-                <a:latin typeface="Helvetica Neue"/>
-                <a:cs typeface="Helvetica Neue"/>
-              </a:rPr>
-              <a:t>requisitos</a:t>
-            </a:r>
-            <a:r>
-              <a:rPr lang="es-ES" sz="3400" spc="-65" dirty="0">
-                <a:latin typeface="Helvetica Neue"/>
-                <a:cs typeface="Helvetica Neue"/>
-              </a:rPr>
-              <a:t> </a:t>
-            </a:r>
-            <a:r>
-              <a:rPr lang="es-ES" sz="3400" dirty="0">
-                <a:latin typeface="Helvetica Neue"/>
-                <a:cs typeface="Helvetica Neue"/>
-              </a:rPr>
-              <a:t>empleando:</a:t>
-            </a:r>
-          </a:p>
-          <a:p>
-            <a:pPr lvl="3">
-              <a:lnSpc>
-                <a:spcPct val="120000"/>
-              </a:lnSpc>
-              <a:buFont typeface="Wingdings" panose="05000000000000000000" pitchFamily="2" charset="2"/>
-              <a:buChar char="ü"/>
-              <a:tabLst>
-                <a:tab pos="926465" algn="l"/>
-                <a:tab pos="927100" algn="l"/>
-              </a:tabLst>
-            </a:pPr>
-            <a:r>
-              <a:rPr lang="es-ES" sz="3000" i="1" dirty="0" err="1">
-                <a:latin typeface="Helvetica Neue"/>
-                <a:cs typeface="Helvetica Neue"/>
-              </a:rPr>
-              <a:t>Scope</a:t>
-            </a:r>
-            <a:r>
-              <a:rPr lang="es-ES" sz="3000" i="1" dirty="0">
-                <a:latin typeface="Helvetica Neue"/>
-                <a:cs typeface="Helvetica Neue"/>
-              </a:rPr>
-              <a:t> Management</a:t>
-            </a:r>
-            <a:r>
-              <a:rPr lang="es-ES" sz="3000" i="1" spc="-100" dirty="0">
-                <a:latin typeface="Helvetica Neue"/>
-                <a:cs typeface="Helvetica Neue"/>
-              </a:rPr>
-              <a:t> </a:t>
-            </a:r>
-            <a:r>
-              <a:rPr lang="es-ES" sz="3000" i="1" dirty="0">
-                <a:latin typeface="Helvetica Neue"/>
-                <a:cs typeface="Helvetica Neue"/>
-              </a:rPr>
-              <a:t>Plan.</a:t>
-            </a:r>
-          </a:p>
-          <a:p>
-            <a:pPr lvl="3">
-              <a:lnSpc>
-                <a:spcPct val="120000"/>
-              </a:lnSpc>
-              <a:buFont typeface="Wingdings" panose="05000000000000000000" pitchFamily="2" charset="2"/>
-              <a:buChar char="ü"/>
-              <a:tabLst>
-                <a:tab pos="926465" algn="l"/>
-                <a:tab pos="927100" algn="l"/>
-              </a:tabLst>
-            </a:pPr>
-            <a:r>
-              <a:rPr lang="es-ES" sz="3000" i="1" spc="-10" dirty="0">
-                <a:latin typeface="Helvetica Neue"/>
-                <a:cs typeface="Helvetica Neue"/>
-              </a:rPr>
-              <a:t>Project </a:t>
-            </a:r>
-            <a:r>
-              <a:rPr lang="es-ES" sz="3000" i="1" dirty="0" err="1">
-                <a:latin typeface="Helvetica Neue"/>
-                <a:cs typeface="Helvetica Neue"/>
-              </a:rPr>
-              <a:t>Scope</a:t>
-            </a:r>
-            <a:r>
-              <a:rPr lang="es-ES" sz="3000" i="1" spc="-85" dirty="0">
-                <a:latin typeface="Helvetica Neue"/>
-                <a:cs typeface="Helvetica Neue"/>
-              </a:rPr>
-              <a:t> </a:t>
-            </a:r>
-            <a:r>
-              <a:rPr lang="es-ES" sz="3000" i="1" dirty="0" err="1">
-                <a:latin typeface="Helvetica Neue"/>
-                <a:cs typeface="Helvetica Neue"/>
-              </a:rPr>
-              <a:t>Statement</a:t>
-            </a:r>
-            <a:r>
-              <a:rPr lang="es-ES" sz="3000" i="1" dirty="0">
-                <a:latin typeface="Helvetica Neue"/>
-                <a:cs typeface="Helvetica Neue"/>
-              </a:rPr>
-              <a:t>.</a:t>
-            </a:r>
           </a:p>
           <a:p>
             <a:endParaRPr lang="es-ES" dirty="0"/>
@@ -16545,7 +16520,7 @@
           <p:nvPr>
             <p:extLst>
               <p:ext uri="{D42A27DB-BD31-4B8C-83A1-F6EECF244321}">
-                <p14:modId xmlns:p14="http://schemas.microsoft.com/office/powerpoint/2010/main" val="1342920283"/>
+                <p14:modId xmlns:p14="http://schemas.microsoft.com/office/powerpoint/2010/main" val="2310161088"/>
               </p:ext>
             </p:extLst>
           </p:nvPr>
@@ -18949,7 +18924,7 @@
                 <a:latin typeface="Helvetica Neue"/>
                 <a:cs typeface="Helvetica Neue"/>
               </a:rPr>
-              <a:t>Fase de PLANIFICACIÓN</a:t>
+              <a:t>Fase de ANÁLISIS Y PLANIFICACIÓN</a:t>
             </a:r>
             <a:r>
               <a:rPr lang="es-ES" sz="2400" spc="15" dirty="0">

</xml_diff>